<commit_message>
1 imagen en los slides
</commit_message>
<xml_diff>
--- a/Delivery 1 - Definition.pptx
+++ b/Delivery 1 - Definition.pptx
@@ -12,14 +12,13 @@
     <p:sldId id="260" r:id="rId6"/>
     <p:sldId id="261" r:id="rId7"/>
     <p:sldId id="262" r:id="rId8"/>
-    <p:sldId id="263" r:id="rId9"/>
-    <p:sldId id="264" r:id="rId10"/>
-    <p:sldId id="265" r:id="rId11"/>
-    <p:sldId id="266" r:id="rId12"/>
-    <p:sldId id="267" r:id="rId13"/>
-    <p:sldId id="268" r:id="rId14"/>
-    <p:sldId id="269" r:id="rId15"/>
-    <p:sldId id="270" r:id="rId16"/>
+    <p:sldId id="264" r:id="rId9"/>
+    <p:sldId id="265" r:id="rId10"/>
+    <p:sldId id="266" r:id="rId11"/>
+    <p:sldId id="267" r:id="rId12"/>
+    <p:sldId id="268" r:id="rId13"/>
+    <p:sldId id="269" r:id="rId14"/>
+    <p:sldId id="270" r:id="rId15"/>
   </p:sldIdLst>
   <p:sldSz cx="12192000" cy="6858000"/>
   <p:notesSz cx="6858000" cy="9144000"/>
@@ -118,6 +117,11 @@
       </a:defRPr>
     </a:lvl9pPr>
   </p:defaultTextStyle>
+  <p:extLst>
+    <p:ext uri="{EFAFB233-063F-42B5-8137-9DF3F51BA10A}">
+      <p15:sldGuideLst xmlns:p15="http://schemas.microsoft.com/office/powerpoint/2012/main"/>
+    </p:ext>
+  </p:extLst>
 </p:presentation>
 </file>
 
@@ -3112,7 +3116,7 @@
             </a:r>
             <a:r>
               <a:rPr lang="en-US" b="1" dirty="0" smtClean="0"/>
-              <a:t> (II)</a:t>
+              <a:t> (III)</a:t>
             </a:r>
             <a:endParaRPr lang="en-US" dirty="0"/>
           </a:p>
@@ -3135,18 +3139,15 @@
           <a:p>
             <a:r>
               <a:rPr lang="en-US" dirty="0" smtClean="0"/>
-              <a:t>SYSTEM AGENT</a:t>
-            </a:r>
-          </a:p>
-          <a:p>
-            <a:endParaRPr lang="en-US" dirty="0"/>
+              <a:t>COORDINATOR AGENT</a:t>
+            </a:r>
           </a:p>
         </p:txBody>
       </p:sp>
     </p:spTree>
     <p:extLst>
       <p:ext uri="{BB962C8B-B14F-4D97-AF65-F5344CB8AC3E}">
-        <p14:creationId xmlns:p14="http://schemas.microsoft.com/office/powerpoint/2010/main" val="1961499553"/>
+        <p14:creationId xmlns:p14="http://schemas.microsoft.com/office/powerpoint/2010/main" val="79488684"/>
       </p:ext>
     </p:extLst>
   </p:cSld>
@@ -3194,7 +3195,7 @@
             </a:r>
             <a:r>
               <a:rPr lang="en-US" b="1" dirty="0" smtClean="0"/>
-              <a:t> (III)</a:t>
+              <a:t> (IV)</a:t>
             </a:r>
             <a:endParaRPr lang="en-US" dirty="0"/>
           </a:p>
@@ -3217,15 +3218,16 @@
           <a:p>
             <a:r>
               <a:rPr lang="en-US" dirty="0" smtClean="0"/>
-              <a:t>COORDINATOR AGENT</a:t>
-            </a:r>
+              <a:t>SCOUT COORDINATOR</a:t>
+            </a:r>
+            <a:endParaRPr lang="en-US" dirty="0"/>
           </a:p>
         </p:txBody>
       </p:sp>
     </p:spTree>
     <p:extLst>
       <p:ext uri="{BB962C8B-B14F-4D97-AF65-F5344CB8AC3E}">
-        <p14:creationId xmlns:p14="http://schemas.microsoft.com/office/powerpoint/2010/main" val="79488684"/>
+        <p14:creationId xmlns:p14="http://schemas.microsoft.com/office/powerpoint/2010/main" val="448878907"/>
       </p:ext>
     </p:extLst>
   </p:cSld>
@@ -3273,7 +3275,7 @@
             </a:r>
             <a:r>
               <a:rPr lang="en-US" b="1" dirty="0" smtClean="0"/>
-              <a:t> (IV)</a:t>
+              <a:t> (V)</a:t>
             </a:r>
             <a:endParaRPr lang="en-US" dirty="0"/>
           </a:p>
@@ -3296,7 +3298,7 @@
           <a:p>
             <a:r>
               <a:rPr lang="en-US" dirty="0" smtClean="0"/>
-              <a:t>SCOUT COORDINATOR</a:t>
+              <a:t>HARVESTER COORDINATOR</a:t>
             </a:r>
             <a:endParaRPr lang="en-US" dirty="0"/>
           </a:p>
@@ -3305,7 +3307,7 @@
     </p:spTree>
     <p:extLst>
       <p:ext uri="{BB962C8B-B14F-4D97-AF65-F5344CB8AC3E}">
-        <p14:creationId xmlns:p14="http://schemas.microsoft.com/office/powerpoint/2010/main" val="448878907"/>
+        <p14:creationId xmlns:p14="http://schemas.microsoft.com/office/powerpoint/2010/main" val="1695770431"/>
       </p:ext>
     </p:extLst>
   </p:cSld>
@@ -3353,86 +3355,6 @@
             </a:r>
             <a:r>
               <a:rPr lang="en-US" b="1" dirty="0" smtClean="0"/>
-              <a:t> (V)</a:t>
-            </a:r>
-            <a:endParaRPr lang="en-US" dirty="0"/>
-          </a:p>
-        </p:txBody>
-      </p:sp>
-      <p:sp>
-        <p:nvSpPr>
-          <p:cNvPr id="3" name="Content Placeholder 2"/>
-          <p:cNvSpPr>
-            <a:spLocks noGrp="1"/>
-          </p:cNvSpPr>
-          <p:nvPr>
-            <p:ph idx="1"/>
-          </p:nvPr>
-        </p:nvSpPr>
-        <p:spPr/>
-        <p:txBody>
-          <a:bodyPr/>
-          <a:lstStyle/>
-          <a:p>
-            <a:r>
-              <a:rPr lang="en-US" dirty="0" smtClean="0"/>
-              <a:t>HARVESTER COORDINATOR</a:t>
-            </a:r>
-            <a:endParaRPr lang="en-US" dirty="0"/>
-          </a:p>
-        </p:txBody>
-      </p:sp>
-    </p:spTree>
-    <p:extLst>
-      <p:ext uri="{BB962C8B-B14F-4D97-AF65-F5344CB8AC3E}">
-        <p14:creationId xmlns:p14="http://schemas.microsoft.com/office/powerpoint/2010/main" val="1695770431"/>
-      </p:ext>
-    </p:extLst>
-  </p:cSld>
-  <p:clrMapOvr>
-    <a:masterClrMapping/>
-  </p:clrMapOvr>
-</p:sld>
-</file>
-
-<file path=ppt/slides/slide14.xml><?xml version="1.0" encoding="utf-8"?>
-<p:sld xmlns:a="http://schemas.openxmlformats.org/drawingml/2006/main" xmlns:r="http://schemas.openxmlformats.org/officeDocument/2006/relationships" xmlns:p="http://schemas.openxmlformats.org/presentationml/2006/main">
-  <p:cSld>
-    <p:spTree>
-      <p:nvGrpSpPr>
-        <p:cNvPr id="1" name=""/>
-        <p:cNvGrpSpPr/>
-        <p:nvPr/>
-      </p:nvGrpSpPr>
-      <p:grpSpPr>
-        <a:xfrm>
-          <a:off x="0" y="0"/>
-          <a:ext cx="0" cy="0"/>
-          <a:chOff x="0" y="0"/>
-          <a:chExt cx="0" cy="0"/>
-        </a:xfrm>
-      </p:grpSpPr>
-      <p:sp>
-        <p:nvSpPr>
-          <p:cNvPr id="2" name="Title 1"/>
-          <p:cNvSpPr>
-            <a:spLocks noGrp="1"/>
-          </p:cNvSpPr>
-          <p:nvPr>
-            <p:ph type="title"/>
-          </p:nvPr>
-        </p:nvSpPr>
-        <p:spPr/>
-        <p:txBody>
-          <a:bodyPr/>
-          <a:lstStyle/>
-          <a:p>
-            <a:r>
-              <a:rPr lang="en-GB" b="1" dirty="0" smtClean="0"/>
-              <a:t>KIND OF ARCHITECTURES &amp; PROPERTIES</a:t>
-            </a:r>
-            <a:r>
-              <a:rPr lang="en-US" b="1" dirty="0" smtClean="0"/>
               <a:t> (VI)</a:t>
             </a:r>
             <a:endParaRPr lang="en-US" dirty="0"/>
@@ -3475,7 +3397,7 @@
 </p:sld>
 </file>
 
-<file path=ppt/slides/slide15.xml><?xml version="1.0" encoding="utf-8"?>
+<file path=ppt/slides/slide14.xml><?xml version="1.0" encoding="utf-8"?>
 <p:sld xmlns:a="http://schemas.openxmlformats.org/drawingml/2006/main" xmlns:r="http://schemas.openxmlformats.org/officeDocument/2006/relationships" xmlns:p="http://schemas.openxmlformats.org/presentationml/2006/main">
   <p:cSld>
     <p:spTree>
@@ -3639,13 +3561,6 @@
               <a:t>DISCRETE</a:t>
             </a:r>
           </a:p>
-          <a:p>
-            <a:r>
-              <a:rPr lang="en-US" dirty="0" smtClean="0"/>
-              <a:t>MULTI - AGENT</a:t>
-            </a:r>
-            <a:endParaRPr lang="en-US" dirty="0"/>
-          </a:p>
         </p:txBody>
       </p:sp>
     </p:spTree>
@@ -3724,6 +3639,36 @@
           </a:p>
         </p:txBody>
       </p:sp>
+      <p:pic>
+        <p:nvPicPr>
+          <p:cNvPr id="4" name="Picture 3"/>
+          <p:cNvPicPr>
+            <a:picLocks noChangeAspect="1"/>
+          </p:cNvPicPr>
+          <p:nvPr/>
+        </p:nvPicPr>
+        <p:blipFill>
+          <a:blip r:embed="rId2">
+            <a:extLst>
+              <a:ext uri="{28A0092B-C50C-407E-A947-70E740481C1C}">
+                <a14:useLocalDpi xmlns:a14="http://schemas.microsoft.com/office/drawing/2010/main" val="0"/>
+              </a:ext>
+            </a:extLst>
+          </a:blip>
+          <a:stretch>
+            <a:fillRect/>
+          </a:stretch>
+        </p:blipFill>
+        <p:spPr>
+          <a:xfrm>
+            <a:off x="4813300" y="2032000"/>
+            <a:ext cx="2552700" cy="2781300"/>
+          </a:xfrm>
+          <a:prstGeom prst="rect">
+            <a:avLst/>
+          </a:prstGeom>
+        </p:spPr>
+      </p:pic>
     </p:spTree>
     <p:extLst>
       <p:ext uri="{BB962C8B-B14F-4D97-AF65-F5344CB8AC3E}">
@@ -4074,32 +4019,72 @@
           <a:lstStyle/>
           <a:p>
             <a:r>
+              <a:rPr lang="en-GB" b="1" dirty="0"/>
+              <a:t>KIND OF </a:t>
+            </a:r>
+            <a:r>
+              <a:rPr lang="en-GB" b="1" dirty="0" smtClean="0"/>
+              <a:t>ARCHITECTURES &amp; PROPERTIES</a:t>
+            </a:r>
+            <a:r>
+              <a:rPr lang="en-US" b="1" dirty="0" smtClean="0"/>
+              <a:t> (I)</a:t>
+            </a:r>
+            <a:endParaRPr lang="en-US" dirty="0"/>
+          </a:p>
+        </p:txBody>
+      </p:sp>
+      <p:sp>
+        <p:nvSpPr>
+          <p:cNvPr id="3" name="Content Placeholder 2"/>
+          <p:cNvSpPr>
+            <a:spLocks noGrp="1"/>
+          </p:cNvSpPr>
+          <p:nvPr>
+            <p:ph idx="1"/>
+          </p:nvPr>
+        </p:nvSpPr>
+        <p:spPr/>
+        <p:txBody>
+          <a:bodyPr/>
+          <a:lstStyle/>
+          <a:p>
+            <a:r>
               <a:rPr lang="en-US" dirty="0" smtClean="0"/>
-              <a:t>ENVIROMENT (VII)</a:t>
-            </a:r>
-            <a:endParaRPr lang="en-US" dirty="0"/>
-          </a:p>
-        </p:txBody>
-      </p:sp>
-      <p:sp>
-        <p:nvSpPr>
-          <p:cNvPr id="3" name="Content Placeholder 2"/>
-          <p:cNvSpPr>
-            <a:spLocks noGrp="1"/>
-          </p:cNvSpPr>
-          <p:nvPr>
-            <p:ph idx="1"/>
-          </p:nvPr>
-        </p:nvSpPr>
-        <p:spPr/>
-        <p:txBody>
-          <a:bodyPr/>
-          <a:lstStyle/>
+              <a:t>SYSTEM AGENT</a:t>
+            </a:r>
+          </a:p>
           <a:p>
             <a:r>
               <a:rPr lang="en-US" dirty="0" smtClean="0"/>
-              <a:t>MULTI - AGENT</a:t>
-            </a:r>
+              <a:t>COORDINATOR AGENT</a:t>
+            </a:r>
+          </a:p>
+          <a:p>
+            <a:r>
+              <a:rPr lang="en-US" dirty="0" smtClean="0"/>
+              <a:t>SCOUT COORDINATOR</a:t>
+            </a:r>
+          </a:p>
+          <a:p>
+            <a:r>
+              <a:rPr lang="en-US" dirty="0" smtClean="0"/>
+              <a:t>HARVESTER COORDINATOR</a:t>
+            </a:r>
+          </a:p>
+          <a:p>
+            <a:r>
+              <a:rPr lang="en-US" dirty="0" smtClean="0"/>
+              <a:t>SCOUTS</a:t>
+            </a:r>
+          </a:p>
+          <a:p>
+            <a:r>
+              <a:rPr lang="en-US" dirty="0" smtClean="0"/>
+              <a:t>HARVESTERS</a:t>
+            </a:r>
+          </a:p>
+          <a:p>
             <a:endParaRPr lang="en-US" dirty="0"/>
           </a:p>
         </p:txBody>
@@ -4107,7 +4092,7 @@
     </p:spTree>
     <p:extLst>
       <p:ext uri="{BB962C8B-B14F-4D97-AF65-F5344CB8AC3E}">
-        <p14:creationId xmlns:p14="http://schemas.microsoft.com/office/powerpoint/2010/main" val="421949896"/>
+        <p14:creationId xmlns:p14="http://schemas.microsoft.com/office/powerpoint/2010/main" val="502878474"/>
       </p:ext>
     </p:extLst>
   </p:cSld>
@@ -4150,16 +4135,12 @@
           <a:lstStyle/>
           <a:p>
             <a:r>
-              <a:rPr lang="en-GB" b="1" dirty="0"/>
-              <a:t>KIND OF </a:t>
-            </a:r>
-            <a:r>
               <a:rPr lang="en-GB" b="1" dirty="0" smtClean="0"/>
-              <a:t>ARCHITECTURES &amp; PROPERTIES</a:t>
+              <a:t>KIND OF ARCHITECTURES &amp; PROPERTIES</a:t>
             </a:r>
             <a:r>
               <a:rPr lang="en-US" b="1" dirty="0" smtClean="0"/>
-              <a:t> (I)</a:t>
+              <a:t> (II)</a:t>
             </a:r>
             <a:endParaRPr lang="en-US" dirty="0"/>
           </a:p>
@@ -4183,36 +4164,6 @@
             <a:r>
               <a:rPr lang="en-US" dirty="0" smtClean="0"/>
               <a:t>SYSTEM AGENT</a:t>
-            </a:r>
-          </a:p>
-          <a:p>
-            <a:r>
-              <a:rPr lang="en-US" dirty="0" smtClean="0"/>
-              <a:t>COORDINATOR AGENT</a:t>
-            </a:r>
-          </a:p>
-          <a:p>
-            <a:r>
-              <a:rPr lang="en-US" dirty="0" smtClean="0"/>
-              <a:t>SCOUT COORDINATOR</a:t>
-            </a:r>
-          </a:p>
-          <a:p>
-            <a:r>
-              <a:rPr lang="en-US" dirty="0" smtClean="0"/>
-              <a:t>HARVESTER COORDINATOR</a:t>
-            </a:r>
-          </a:p>
-          <a:p>
-            <a:r>
-              <a:rPr lang="en-US" dirty="0" smtClean="0"/>
-              <a:t>SCOUTS</a:t>
-            </a:r>
-          </a:p>
-          <a:p>
-            <a:r>
-              <a:rPr lang="en-US" dirty="0" smtClean="0"/>
-              <a:t>HARVESTERS</a:t>
             </a:r>
           </a:p>
           <a:p>
@@ -4223,7 +4174,7 @@
     </p:spTree>
     <p:extLst>
       <p:ext uri="{BB962C8B-B14F-4D97-AF65-F5344CB8AC3E}">
-        <p14:creationId xmlns:p14="http://schemas.microsoft.com/office/powerpoint/2010/main" val="502878474"/>
+        <p14:creationId xmlns:p14="http://schemas.microsoft.com/office/powerpoint/2010/main" val="1961499553"/>
       </p:ext>
     </p:extLst>
   </p:cSld>

</xml_diff>